<commit_message>
Terminarios cap 1 terminados y avances con la presentacion
</commit_message>
<xml_diff>
--- a/src/Utilidades/Presentacion-plantilla.pptx
+++ b/src/Utilidades/Presentacion-plantilla.pptx
@@ -4,9 +4,6 @@
   <p:sldMasterIdLst>
     <p:sldMasterId id="2147483648" r:id="rId1"/>
   </p:sldMasterIdLst>
-  <p:sldIdLst>
-    <p:sldId id="256" r:id="rId2"/>
-  </p:sldIdLst>
   <p:sldSz cx="9144000" cy="6858000" type="screen4x3"/>
   <p:notesSz cx="6858000" cy="9144000"/>
   <p:defaultTextStyle>
@@ -288,7 +285,7 @@
           <a:p>
             <a:fld id="{E18D44BE-723D-47A8-A3BB-C1DEB786C0BD}" type="datetimeFigureOut">
               <a:rPr lang="es-GT" smtClean="0"/>
-              <a:t>23/11/2016</a:t>
+              <a:t>27/11/2016</a:t>
             </a:fld>
             <a:endParaRPr lang="es-GT"/>
           </a:p>
@@ -541,7 +538,7 @@
           <a:p>
             <a:fld id="{E18D44BE-723D-47A8-A3BB-C1DEB786C0BD}" type="datetimeFigureOut">
               <a:rPr lang="es-GT" smtClean="0"/>
-              <a:t>23/11/2016</a:t>
+              <a:t>27/11/2016</a:t>
             </a:fld>
             <a:endParaRPr lang="es-GT"/>
           </a:p>
@@ -711,7 +708,7 @@
           <a:p>
             <a:fld id="{E18D44BE-723D-47A8-A3BB-C1DEB786C0BD}" type="datetimeFigureOut">
               <a:rPr lang="es-GT" smtClean="0"/>
-              <a:t>23/11/2016</a:t>
+              <a:t>27/11/2016</a:t>
             </a:fld>
             <a:endParaRPr lang="es-GT"/>
           </a:p>
@@ -891,7 +888,7 @@
           <a:p>
             <a:fld id="{E18D44BE-723D-47A8-A3BB-C1DEB786C0BD}" type="datetimeFigureOut">
               <a:rPr lang="es-GT" smtClean="0"/>
-              <a:t>23/11/2016</a:t>
+              <a:t>27/11/2016</a:t>
             </a:fld>
             <a:endParaRPr lang="es-GT"/>
           </a:p>
@@ -986,7 +983,11 @@
           </a:bodyPr>
           <a:lstStyle>
             <a:lvl1pPr>
-              <a:defRPr sz="3600" baseline="0"/>
+              <a:defRPr sz="3600" baseline="0">
+                <a:solidFill>
+                  <a:schemeClr val="tx1"/>
+                </a:solidFill>
+              </a:defRPr>
             </a:lvl1pPr>
           </a:lstStyle>
           <a:p>
@@ -1015,7 +1016,7 @@
           <a:p>
             <a:fld id="{E18D44BE-723D-47A8-A3BB-C1DEB786C0BD}" type="datetimeFigureOut">
               <a:rPr lang="es-GT" smtClean="0"/>
-              <a:t>23/11/2016</a:t>
+              <a:t>27/11/2016</a:t>
             </a:fld>
             <a:endParaRPr lang="es-GT"/>
           </a:p>
@@ -1036,7 +1037,7 @@
           <a:bodyPr/>
           <a:lstStyle/>
           <a:p>
-            <a:endParaRPr lang="es-GT"/>
+            <a:endParaRPr lang="es-GT" dirty="0"/>
           </a:p>
         </p:txBody>
       </p:sp>
@@ -1075,7 +1076,7 @@
         </p:nvSpPr>
         <p:spPr>
           <a:xfrm>
-            <a:off x="539750" y="1484313"/>
+            <a:off x="611758" y="1484784"/>
             <a:ext cx="8064500" cy="431800"/>
           </a:xfrm>
         </p:spPr>
@@ -1117,7 +1118,173 @@
           <a:bodyPr/>
           <a:lstStyle/>
           <a:p>
-            <a:endParaRPr lang="es-GT"/>
+            <a:endParaRPr lang="es-GT" dirty="0"/>
+          </a:p>
+        </p:txBody>
+      </p:sp>
+      <p:sp>
+        <p:nvSpPr>
+          <p:cNvPr id="6" name="5 Rectángulo"/>
+          <p:cNvSpPr/>
+          <p:nvPr userDrawn="1"/>
+        </p:nvSpPr>
+        <p:spPr>
+          <a:xfrm>
+            <a:off x="0" y="0"/>
+            <a:ext cx="4644008" cy="332656"/>
+          </a:xfrm>
+          <a:prstGeom prst="rect">
+            <a:avLst/>
+          </a:prstGeom>
+          <a:solidFill>
+            <a:srgbClr val="4374DE"/>
+          </a:solidFill>
+          <a:ln>
+            <a:noFill/>
+          </a:ln>
+        </p:spPr>
+        <p:style>
+          <a:lnRef idx="2">
+            <a:schemeClr val="accent1">
+              <a:shade val="50000"/>
+            </a:schemeClr>
+          </a:lnRef>
+          <a:fillRef idx="1">
+            <a:schemeClr val="accent1"/>
+          </a:fillRef>
+          <a:effectRef idx="0">
+            <a:schemeClr val="accent1"/>
+          </a:effectRef>
+          <a:fontRef idx="minor">
+            <a:schemeClr val="lt1"/>
+          </a:fontRef>
+        </p:style>
+        <p:txBody>
+          <a:bodyPr rtlCol="0" anchor="ctr"/>
+          <a:lstStyle/>
+          <a:p>
+            <a:pPr algn="ctr"/>
+            <a:endParaRPr lang="es-GT"/>
+          </a:p>
+        </p:txBody>
+      </p:sp>
+      <p:sp>
+        <p:nvSpPr>
+          <p:cNvPr id="10" name="9 Rectángulo"/>
+          <p:cNvSpPr/>
+          <p:nvPr userDrawn="1"/>
+        </p:nvSpPr>
+        <p:spPr>
+          <a:xfrm>
+            <a:off x="4644008" y="0"/>
+            <a:ext cx="4499992" cy="332656"/>
+          </a:xfrm>
+          <a:prstGeom prst="rect">
+            <a:avLst/>
+          </a:prstGeom>
+          <a:solidFill>
+            <a:srgbClr val="CCD7F5"/>
+          </a:solidFill>
+          <a:ln>
+            <a:noFill/>
+          </a:ln>
+        </p:spPr>
+        <p:style>
+          <a:lnRef idx="2">
+            <a:schemeClr val="accent1">
+              <a:shade val="50000"/>
+            </a:schemeClr>
+          </a:lnRef>
+          <a:fillRef idx="1">
+            <a:schemeClr val="accent1"/>
+          </a:fillRef>
+          <a:effectRef idx="0">
+            <a:schemeClr val="accent1"/>
+          </a:effectRef>
+          <a:fontRef idx="minor">
+            <a:schemeClr val="lt1"/>
+          </a:fontRef>
+        </p:style>
+        <p:txBody>
+          <a:bodyPr rtlCol="0" anchor="ctr"/>
+          <a:lstStyle/>
+          <a:p>
+            <a:pPr algn="ctr"/>
+            <a:endParaRPr lang="es-GT"/>
+          </a:p>
+        </p:txBody>
+      </p:sp>
+      <p:sp>
+        <p:nvSpPr>
+          <p:cNvPr id="11" name="10 Marcador de texto"/>
+          <p:cNvSpPr>
+            <a:spLocks noGrp="1"/>
+          </p:cNvSpPr>
+          <p:nvPr>
+            <p:ph type="body" sz="quarter" idx="16"/>
+          </p:nvPr>
+        </p:nvSpPr>
+        <p:spPr>
+          <a:xfrm>
+            <a:off x="4644008" y="-25400"/>
+            <a:ext cx="4321175" cy="191728"/>
+          </a:xfrm>
+        </p:spPr>
+        <p:txBody>
+          <a:bodyPr>
+            <a:noAutofit/>
+          </a:bodyPr>
+          <a:lstStyle>
+            <a:lvl1pPr marL="0" indent="0" algn="r">
+              <a:buNone/>
+              <a:defRPr sz="1400" baseline="0">
+                <a:solidFill>
+                  <a:srgbClr val="4374DE"/>
+                </a:solidFill>
+                <a:latin typeface="Open Sans Condensed" pitchFamily="34" charset="0"/>
+              </a:defRPr>
+            </a:lvl1pPr>
+          </a:lstStyle>
+          <a:p>
+            <a:pPr lvl="0"/>
+            <a:endParaRPr lang="es-GT" dirty="0"/>
+          </a:p>
+        </p:txBody>
+      </p:sp>
+      <p:sp>
+        <p:nvSpPr>
+          <p:cNvPr id="12" name="10 Marcador de texto"/>
+          <p:cNvSpPr>
+            <a:spLocks noGrp="1"/>
+          </p:cNvSpPr>
+          <p:nvPr>
+            <p:ph type="body" sz="quarter" idx="17"/>
+          </p:nvPr>
+        </p:nvSpPr>
+        <p:spPr>
+          <a:xfrm>
+            <a:off x="0" y="0"/>
+            <a:ext cx="4321175" cy="191728"/>
+          </a:xfrm>
+        </p:spPr>
+        <p:txBody>
+          <a:bodyPr>
+            <a:noAutofit/>
+          </a:bodyPr>
+          <a:lstStyle>
+            <a:lvl1pPr marL="0" indent="0" algn="l">
+              <a:buNone/>
+              <a:defRPr sz="1400" baseline="0">
+                <a:solidFill>
+                  <a:schemeClr val="bg1"/>
+                </a:solidFill>
+                <a:latin typeface="Open Sans Condensed" pitchFamily="34" charset="0"/>
+              </a:defRPr>
+            </a:lvl1pPr>
+          </a:lstStyle>
+          <a:p>
+            <a:pPr lvl="0"/>
+            <a:endParaRPr lang="es-GT" dirty="0"/>
           </a:p>
         </p:txBody>
       </p:sp>
@@ -1243,7 +1410,7 @@
           <a:p>
             <a:fld id="{E18D44BE-723D-47A8-A3BB-C1DEB786C0BD}" type="datetimeFigureOut">
               <a:rPr lang="es-GT" smtClean="0"/>
-              <a:t>23/11/2016</a:t>
+              <a:t>27/11/2016</a:t>
             </a:fld>
             <a:endParaRPr lang="es-GT"/>
           </a:p>
@@ -1489,7 +1656,7 @@
           <a:p>
             <a:fld id="{E18D44BE-723D-47A8-A3BB-C1DEB786C0BD}" type="datetimeFigureOut">
               <a:rPr lang="es-GT" smtClean="0"/>
-              <a:t>23/11/2016</a:t>
+              <a:t>27/11/2016</a:t>
             </a:fld>
             <a:endParaRPr lang="es-GT"/>
           </a:p>
@@ -1777,7 +1944,7 @@
           <a:p>
             <a:fld id="{E18D44BE-723D-47A8-A3BB-C1DEB786C0BD}" type="datetimeFigureOut">
               <a:rPr lang="es-GT" smtClean="0"/>
-              <a:t>23/11/2016</a:t>
+              <a:t>27/11/2016</a:t>
             </a:fld>
             <a:endParaRPr lang="es-GT"/>
           </a:p>
@@ -2199,7 +2366,7 @@
           <a:p>
             <a:fld id="{E18D44BE-723D-47A8-A3BB-C1DEB786C0BD}" type="datetimeFigureOut">
               <a:rPr lang="es-GT" smtClean="0"/>
-              <a:t>23/11/2016</a:t>
+              <a:t>27/11/2016</a:t>
             </a:fld>
             <a:endParaRPr lang="es-GT"/>
           </a:p>
@@ -2317,7 +2484,7 @@
           <a:p>
             <a:fld id="{E18D44BE-723D-47A8-A3BB-C1DEB786C0BD}" type="datetimeFigureOut">
               <a:rPr lang="es-GT" smtClean="0"/>
-              <a:t>23/11/2016</a:t>
+              <a:t>27/11/2016</a:t>
             </a:fld>
             <a:endParaRPr lang="es-GT"/>
           </a:p>
@@ -2412,7 +2579,7 @@
           <a:p>
             <a:fld id="{E18D44BE-723D-47A8-A3BB-C1DEB786C0BD}" type="datetimeFigureOut">
               <a:rPr lang="es-GT" smtClean="0"/>
-              <a:t>23/11/2016</a:t>
+              <a:t>27/11/2016</a:t>
             </a:fld>
             <a:endParaRPr lang="es-GT"/>
           </a:p>
@@ -2689,7 +2856,7 @@
           <a:p>
             <a:fld id="{E18D44BE-723D-47A8-A3BB-C1DEB786C0BD}" type="datetimeFigureOut">
               <a:rPr lang="es-GT" smtClean="0"/>
-              <a:t>23/11/2016</a:t>
+              <a:t>27/11/2016</a:t>
             </a:fld>
             <a:endParaRPr lang="es-GT"/>
           </a:p>
@@ -2902,7 +3069,7 @@
           <a:p>
             <a:fld id="{E18D44BE-723D-47A8-A3BB-C1DEB786C0BD}" type="datetimeFigureOut">
               <a:rPr lang="es-GT" smtClean="0"/>
-              <a:t>23/11/2016</a:t>
+              <a:t>27/11/2016</a:t>
             </a:fld>
             <a:endParaRPr lang="es-GT"/>
           </a:p>
@@ -3261,74 +3428,6 @@
 </p:sldMaster>
 </file>
 
-<file path=ppt/slides/slide1.xml><?xml version="1.0" encoding="utf-8"?>
-<p:sld xmlns:a="http://schemas.openxmlformats.org/drawingml/2006/main" xmlns:r="http://schemas.openxmlformats.org/officeDocument/2006/relationships" xmlns:p="http://schemas.openxmlformats.org/presentationml/2006/main">
-  <p:cSld>
-    <p:spTree>
-      <p:nvGrpSpPr>
-        <p:cNvPr id="1" name=""/>
-        <p:cNvGrpSpPr/>
-        <p:nvPr/>
-      </p:nvGrpSpPr>
-      <p:grpSpPr>
-        <a:xfrm>
-          <a:off x="0" y="0"/>
-          <a:ext cx="0" cy="0"/>
-          <a:chOff x="0" y="0"/>
-          <a:chExt cx="0" cy="0"/>
-        </a:xfrm>
-      </p:grpSpPr>
-      <p:sp>
-        <p:nvSpPr>
-          <p:cNvPr id="2" name="1 Título"/>
-          <p:cNvSpPr>
-            <a:spLocks noGrp="1"/>
-          </p:cNvSpPr>
-          <p:nvPr>
-            <p:ph type="ctrTitle"/>
-          </p:nvPr>
-        </p:nvSpPr>
-        <p:spPr/>
-        <p:txBody>
-          <a:bodyPr/>
-          <a:lstStyle/>
-          <a:p>
-            <a:endParaRPr lang="es-GT"/>
-          </a:p>
-        </p:txBody>
-      </p:sp>
-      <p:sp>
-        <p:nvSpPr>
-          <p:cNvPr id="3" name="2 Subtítulo"/>
-          <p:cNvSpPr>
-            <a:spLocks noGrp="1"/>
-          </p:cNvSpPr>
-          <p:nvPr>
-            <p:ph type="subTitle" idx="1"/>
-          </p:nvPr>
-        </p:nvSpPr>
-        <p:spPr/>
-        <p:txBody>
-          <a:bodyPr/>
-          <a:lstStyle/>
-          <a:p>
-            <a:endParaRPr lang="es-GT"/>
-          </a:p>
-        </p:txBody>
-      </p:sp>
-    </p:spTree>
-    <p:extLst>
-      <p:ext uri="{BB962C8B-B14F-4D97-AF65-F5344CB8AC3E}">
-        <p14:creationId xmlns:p14="http://schemas.microsoft.com/office/powerpoint/2010/main" val="1160789077"/>
-      </p:ext>
-    </p:extLst>
-  </p:cSld>
-  <p:clrMapOvr>
-    <a:masterClrMapping/>
-  </p:clrMapOvr>
-</p:sld>
-</file>
-
 <file path=ppt/theme/theme1.xml><?xml version="1.0" encoding="utf-8"?>
 <a:theme xmlns:a="http://schemas.openxmlformats.org/drawingml/2006/main" name="Tema de Office">
   <a:themeElements>

</xml_diff>